<commit_message>
Front end departmnet manager menu added
</commit_message>
<xml_diff>
--- a/frontEndDesign.pptx
+++ b/frontEndDesign.pptx
@@ -221,7 +221,7 @@
           <a:p>
             <a:fld id="{AF9A606E-BCAC-AE42-8ACB-DAE07CACBE6C}" type="datetimeFigureOut">
               <a:rPr lang="en-US" smtClean="0"/>
-              <a:t>6/19/2025</a:t>
+              <a:t>7/17/2025</a:t>
             </a:fld>
             <a:endParaRPr lang="en-US"/>
           </a:p>
@@ -830,7 +830,7 @@
           <a:p>
             <a:fld id="{20658211-571D-7C41-A3C4-A85B30D87595}" type="datetimeFigureOut">
               <a:rPr lang="en-US" smtClean="0"/>
-              <a:t>6/19/2025</a:t>
+              <a:t>7/17/2025</a:t>
             </a:fld>
             <a:endParaRPr lang="en-US"/>
           </a:p>
@@ -1030,7 +1030,7 @@
           <a:p>
             <a:fld id="{20658211-571D-7C41-A3C4-A85B30D87595}" type="datetimeFigureOut">
               <a:rPr lang="en-US" smtClean="0"/>
-              <a:t>6/19/2025</a:t>
+              <a:t>7/17/2025</a:t>
             </a:fld>
             <a:endParaRPr lang="en-US"/>
           </a:p>
@@ -1240,7 +1240,7 @@
           <a:p>
             <a:fld id="{20658211-571D-7C41-A3C4-A85B30D87595}" type="datetimeFigureOut">
               <a:rPr lang="en-US" smtClean="0"/>
-              <a:t>6/19/2025</a:t>
+              <a:t>7/17/2025</a:t>
             </a:fld>
             <a:endParaRPr lang="en-US"/>
           </a:p>
@@ -1440,7 +1440,7 @@
           <a:p>
             <a:fld id="{20658211-571D-7C41-A3C4-A85B30D87595}" type="datetimeFigureOut">
               <a:rPr lang="en-US" smtClean="0"/>
-              <a:t>6/19/2025</a:t>
+              <a:t>7/17/2025</a:t>
             </a:fld>
             <a:endParaRPr lang="en-US"/>
           </a:p>
@@ -1716,7 +1716,7 @@
           <a:p>
             <a:fld id="{20658211-571D-7C41-A3C4-A85B30D87595}" type="datetimeFigureOut">
               <a:rPr lang="en-US" smtClean="0"/>
-              <a:t>6/19/2025</a:t>
+              <a:t>7/17/2025</a:t>
             </a:fld>
             <a:endParaRPr lang="en-US"/>
           </a:p>
@@ -1984,7 +1984,7 @@
           <a:p>
             <a:fld id="{20658211-571D-7C41-A3C4-A85B30D87595}" type="datetimeFigureOut">
               <a:rPr lang="en-US" smtClean="0"/>
-              <a:t>6/19/2025</a:t>
+              <a:t>7/17/2025</a:t>
             </a:fld>
             <a:endParaRPr lang="en-US"/>
           </a:p>
@@ -2399,7 +2399,7 @@
           <a:p>
             <a:fld id="{20658211-571D-7C41-A3C4-A85B30D87595}" type="datetimeFigureOut">
               <a:rPr lang="en-US" smtClean="0"/>
-              <a:t>6/19/2025</a:t>
+              <a:t>7/17/2025</a:t>
             </a:fld>
             <a:endParaRPr lang="en-US"/>
           </a:p>
@@ -2541,7 +2541,7 @@
           <a:p>
             <a:fld id="{20658211-571D-7C41-A3C4-A85B30D87595}" type="datetimeFigureOut">
               <a:rPr lang="en-US" smtClean="0"/>
-              <a:t>6/19/2025</a:t>
+              <a:t>7/17/2025</a:t>
             </a:fld>
             <a:endParaRPr lang="en-US"/>
           </a:p>
@@ -2654,7 +2654,7 @@
           <a:p>
             <a:fld id="{20658211-571D-7C41-A3C4-A85B30D87595}" type="datetimeFigureOut">
               <a:rPr lang="en-US" smtClean="0"/>
-              <a:t>6/19/2025</a:t>
+              <a:t>7/17/2025</a:t>
             </a:fld>
             <a:endParaRPr lang="en-US"/>
           </a:p>
@@ -2967,7 +2967,7 @@
           <a:p>
             <a:fld id="{20658211-571D-7C41-A3C4-A85B30D87595}" type="datetimeFigureOut">
               <a:rPr lang="en-US" smtClean="0"/>
-              <a:t>6/19/2025</a:t>
+              <a:t>7/17/2025</a:t>
             </a:fld>
             <a:endParaRPr lang="en-US"/>
           </a:p>
@@ -3256,7 +3256,7 @@
           <a:p>
             <a:fld id="{20658211-571D-7C41-A3C4-A85B30D87595}" type="datetimeFigureOut">
               <a:rPr lang="en-US" smtClean="0"/>
-              <a:t>6/19/2025</a:t>
+              <a:t>7/17/2025</a:t>
             </a:fld>
             <a:endParaRPr lang="en-US"/>
           </a:p>
@@ -3499,7 +3499,7 @@
           <a:p>
             <a:fld id="{20658211-571D-7C41-A3C4-A85B30D87595}" type="datetimeFigureOut">
               <a:rPr lang="en-US" smtClean="0"/>
-              <a:t>6/19/2025</a:t>
+              <a:t>7/17/2025</a:t>
             </a:fld>
             <a:endParaRPr lang="en-US"/>
           </a:p>
@@ -38145,7 +38145,7 @@
         </p:nvGraphicFramePr>
         <p:xfrm>
           <a:off x="630756" y="1626475"/>
-          <a:ext cx="7598844" cy="1615440"/>
+          <a:ext cx="7598844" cy="1828800"/>
         </p:xfrm>
         <a:graphic>
           <a:graphicData uri="http://schemas.openxmlformats.org/drawingml/2006/table">
@@ -39851,7 +39851,7 @@
         </p:blipFill>
         <p:spPr bwMode="auto">
           <a:xfrm>
-            <a:off x="3934584" y="3147046"/>
+            <a:off x="3947284" y="3229775"/>
             <a:ext cx="668421" cy="668421"/>
           </a:xfrm>
           <a:prstGeom prst="rect">

</xml_diff>